<commit_message>
ppt update and ex code update
</commit_message>
<xml_diff>
--- a/教學簡報/Bootstrap 4.pptx
+++ b/教學簡報/Bootstrap 4.pptx
@@ -1265,49 +1265,7 @@
               <a:rPr lang="en-US" altLang="zh-TW" sz="1200" dirty="0">
                 <a:latin typeface="Consolas" panose="020B0609020204030204" pitchFamily="49" charset="0"/>
               </a:rPr>
-              <a:t>" integrity="</a:t>
-            </a:r>
-            <a:r>
-              <a:rPr lang="en-US" altLang="zh-TW" sz="1200" dirty="0">
-                <a:solidFill>
-                  <a:srgbClr val="00B050"/>
-                </a:solidFill>
-                <a:latin typeface="Consolas" panose="020B0609020204030204" pitchFamily="49" charset="0"/>
-              </a:rPr>
-              <a:t>sha384-9aIt2nRpC12Uk9gS9baDl411NQApFmC26EwAOH8WgZl5MYYxFfc+NcPb1dKGj7Sk</a:t>
-            </a:r>
-            <a:r>
-              <a:rPr lang="en-US" altLang="zh-TW" sz="1200" dirty="0">
-                <a:latin typeface="Consolas" panose="020B0609020204030204" pitchFamily="49" charset="0"/>
-              </a:rPr>
-              <a:t>" </a:t>
-            </a:r>
-            <a:r>
-              <a:rPr lang="en-US" altLang="zh-TW" sz="1200" dirty="0" err="1">
-                <a:latin typeface="Consolas" panose="020B0609020204030204" pitchFamily="49" charset="0"/>
-              </a:rPr>
-              <a:t>crossorigin</a:t>
-            </a:r>
-            <a:r>
-              <a:rPr lang="en-US" altLang="zh-TW" sz="1200" dirty="0">
-                <a:latin typeface="Consolas" panose="020B0609020204030204" pitchFamily="49" charset="0"/>
-              </a:rPr>
-              <a:t>="</a:t>
-            </a:r>
-            <a:r>
-              <a:rPr lang="en-US" altLang="zh-TW" sz="1200" dirty="0">
-                <a:solidFill>
-                  <a:srgbClr val="00B050"/>
-                </a:solidFill>
-                <a:latin typeface="Consolas" panose="020B0609020204030204" pitchFamily="49" charset="0"/>
-              </a:rPr>
-              <a:t>anonymous</a:t>
-            </a:r>
-            <a:r>
-              <a:rPr lang="en-US" altLang="zh-TW" sz="1200" dirty="0">
-                <a:latin typeface="Consolas" panose="020B0609020204030204" pitchFamily="49" charset="0"/>
-              </a:rPr>
-              <a:t>"&gt;</a:t>
+              <a:t>&gt;</a:t>
             </a:r>
           </a:p>
         </p:txBody>
@@ -1402,115 +1360,7 @@
                 <a:ea typeface="微軟正黑體" panose="020B0604030504040204" pitchFamily="34" charset="-120"/>
                 <a:cs typeface="+mn-cs"/>
               </a:rPr>
-              <a:t>&lt;script </a:t>
-            </a:r>
-            <a:r>
-              <a:rPr lang="en" altLang="zh-TW" sz="1200" b="0" kern="1200" dirty="0" err="1">
-                <a:solidFill>
-                  <a:schemeClr val="tx1"/>
-                </a:solidFill>
-                <a:effectLst/>
-                <a:latin typeface="+mn-lt"/>
-                <a:ea typeface="微軟正黑體" panose="020B0604030504040204" pitchFamily="34" charset="-120"/>
-                <a:cs typeface="+mn-cs"/>
-              </a:rPr>
-              <a:t>src</a:t>
-            </a:r>
-            <a:r>
-              <a:rPr lang="en" altLang="zh-TW" sz="1200" b="0" kern="1200" dirty="0">
-                <a:solidFill>
-                  <a:schemeClr val="tx1"/>
-                </a:solidFill>
-                <a:effectLst/>
-                <a:latin typeface="+mn-lt"/>
-                <a:ea typeface="微軟正黑體" panose="020B0604030504040204" pitchFamily="34" charset="-120"/>
-                <a:cs typeface="+mn-cs"/>
-              </a:rPr>
-              <a:t>="https://</a:t>
-            </a:r>
-            <a:r>
-              <a:rPr lang="en" altLang="zh-TW" sz="1200" b="0" kern="1200" dirty="0" err="1">
-                <a:solidFill>
-                  <a:schemeClr val="tx1"/>
-                </a:solidFill>
-                <a:effectLst/>
-                <a:latin typeface="+mn-lt"/>
-                <a:ea typeface="微軟正黑體" panose="020B0604030504040204" pitchFamily="34" charset="-120"/>
-                <a:cs typeface="+mn-cs"/>
-              </a:rPr>
-              <a:t>code.jquery.com</a:t>
-            </a:r>
-            <a:r>
-              <a:rPr lang="en" altLang="zh-TW" sz="1200" b="0" kern="1200" dirty="0">
-                <a:solidFill>
-                  <a:schemeClr val="tx1"/>
-                </a:solidFill>
-                <a:effectLst/>
-                <a:latin typeface="+mn-lt"/>
-                <a:ea typeface="微軟正黑體" panose="020B0604030504040204" pitchFamily="34" charset="-120"/>
-                <a:cs typeface="+mn-cs"/>
-              </a:rPr>
-              <a:t>/jquery-3.5.1.slim.min.js"</a:t>
-            </a:r>
-            <a:r>
-              <a:rPr lang="zh-TW" altLang="en-US" sz="1200" b="0" kern="1200" dirty="0">
-                <a:solidFill>
-                  <a:schemeClr val="tx1"/>
-                </a:solidFill>
-                <a:effectLst/>
-                <a:latin typeface="+mn-lt"/>
-                <a:ea typeface="微軟正黑體" panose="020B0604030504040204" pitchFamily="34" charset="-120"/>
-                <a:cs typeface="+mn-cs"/>
-              </a:rPr>
-              <a:t> </a:t>
-            </a:r>
-            <a:r>
-              <a:rPr lang="en" altLang="zh-TW" sz="1200" b="0" kern="1200" dirty="0">
-                <a:solidFill>
-                  <a:schemeClr val="tx1"/>
-                </a:solidFill>
-                <a:effectLst/>
-                <a:latin typeface="+mn-lt"/>
-                <a:ea typeface="微軟正黑體" panose="020B0604030504040204" pitchFamily="34" charset="-120"/>
-                <a:cs typeface="+mn-cs"/>
-              </a:rPr>
-              <a:t>integrity="sha384-DfXdz2htPH0lsSSs5nCTpuj/zy4C+OGpamoFVy38MVBnE+IbbVYUew+OrCXaRkfj"</a:t>
-            </a:r>
-            <a:r>
-              <a:rPr lang="zh-TW" altLang="en-US" sz="1200" b="0" kern="1200" dirty="0">
-                <a:solidFill>
-                  <a:schemeClr val="tx1"/>
-                </a:solidFill>
-                <a:effectLst/>
-                <a:latin typeface="+mn-lt"/>
-                <a:ea typeface="微軟正黑體" panose="020B0604030504040204" pitchFamily="34" charset="-120"/>
-                <a:cs typeface="+mn-cs"/>
-              </a:rPr>
-              <a:t> </a:t>
-            </a:r>
-            <a:r>
-              <a:rPr lang="en" altLang="zh-TW" sz="1200" b="0" kern="1200" dirty="0" err="1">
-                <a:solidFill>
-                  <a:schemeClr val="tx1"/>
-                </a:solidFill>
-                <a:effectLst/>
-                <a:latin typeface="+mn-lt"/>
-                <a:ea typeface="微軟正黑體" panose="020B0604030504040204" pitchFamily="34" charset="-120"/>
-                <a:cs typeface="+mn-cs"/>
-              </a:rPr>
-              <a:t>crossorigin</a:t>
-            </a:r>
-            <a:r>
-              <a:rPr lang="en" altLang="zh-TW" sz="1200" b="0" kern="1200" dirty="0">
-                <a:solidFill>
-                  <a:schemeClr val="tx1"/>
-                </a:solidFill>
-                <a:effectLst/>
-                <a:latin typeface="+mn-lt"/>
-                <a:ea typeface="微軟正黑體" panose="020B0604030504040204" pitchFamily="34" charset="-120"/>
-                <a:cs typeface="+mn-cs"/>
-              </a:rPr>
-              <a:t>="anonymous"&gt;&lt;/script&gt;</a:t>
+              <a:t>&lt;script src="https://code.jquery.com/jquery-3.5.1.slim.min.js&gt;&lt;/script&gt;</a:t>
             </a:r>
           </a:p>
           <a:p>
@@ -1522,147 +1372,7 @@
                 <a:cs typeface="+mj-cs"/>
                 <a:sym typeface="Calibri"/>
               </a:rPr>
-              <a:t>&lt;script </a:t>
-            </a:r>
-            <a:r>
-              <a:rPr lang="en" altLang="zh-TW" sz="1200" b="0" dirty="0" err="1">
-                <a:effectLst/>
-                <a:latin typeface="+mj-lt"/>
-                <a:ea typeface="+mj-ea"/>
-                <a:cs typeface="+mj-cs"/>
-                <a:sym typeface="Calibri"/>
-              </a:rPr>
-              <a:t>src</a:t>
-            </a:r>
-            <a:r>
-              <a:rPr lang="en" altLang="zh-TW" sz="1200" b="0" dirty="0">
-                <a:effectLst/>
-                <a:latin typeface="+mj-lt"/>
-                <a:ea typeface="+mj-ea"/>
-                <a:cs typeface="+mj-cs"/>
-                <a:sym typeface="Calibri"/>
-              </a:rPr>
-              <a:t>="https://</a:t>
-            </a:r>
-            <a:r>
-              <a:rPr lang="en" altLang="zh-TW" sz="1200" b="0" dirty="0" err="1">
-                <a:effectLst/>
-                <a:latin typeface="+mj-lt"/>
-                <a:ea typeface="+mj-ea"/>
-                <a:cs typeface="+mj-cs"/>
-                <a:sym typeface="Calibri"/>
-              </a:rPr>
-              <a:t>cdn.jsdelivr.net</a:t>
-            </a:r>
-            <a:r>
-              <a:rPr lang="en" altLang="zh-TW" sz="1200" b="0" dirty="0">
-                <a:effectLst/>
-                <a:latin typeface="+mj-lt"/>
-                <a:ea typeface="+mj-ea"/>
-                <a:cs typeface="+mj-cs"/>
-                <a:sym typeface="Calibri"/>
-              </a:rPr>
-              <a:t>/</a:t>
-            </a:r>
-            <a:r>
-              <a:rPr lang="en" altLang="zh-TW" sz="1200" b="0" dirty="0" err="1">
-                <a:effectLst/>
-                <a:latin typeface="+mj-lt"/>
-                <a:ea typeface="+mj-ea"/>
-                <a:cs typeface="+mj-cs"/>
-                <a:sym typeface="Calibri"/>
-              </a:rPr>
-              <a:t>npm</a:t>
-            </a:r>
-            <a:r>
-              <a:rPr lang="en" altLang="zh-TW" sz="1200" b="0" dirty="0">
-                <a:effectLst/>
-                <a:latin typeface="+mj-lt"/>
-                <a:ea typeface="+mj-ea"/>
-                <a:cs typeface="+mj-cs"/>
-                <a:sym typeface="Calibri"/>
-              </a:rPr>
-              <a:t>/popper.js@1.16.0/</a:t>
-            </a:r>
-            <a:r>
-              <a:rPr lang="en" altLang="zh-TW" sz="1200" b="0" dirty="0" err="1">
-                <a:effectLst/>
-                <a:latin typeface="+mj-lt"/>
-                <a:ea typeface="+mj-ea"/>
-                <a:cs typeface="+mj-cs"/>
-                <a:sym typeface="Calibri"/>
-              </a:rPr>
-              <a:t>dist</a:t>
-            </a:r>
-            <a:r>
-              <a:rPr lang="en" altLang="zh-TW" sz="1200" b="0" dirty="0">
-                <a:effectLst/>
-                <a:latin typeface="+mj-lt"/>
-                <a:ea typeface="+mj-ea"/>
-                <a:cs typeface="+mj-cs"/>
-                <a:sym typeface="Calibri"/>
-              </a:rPr>
-              <a:t>/</a:t>
-            </a:r>
-            <a:r>
-              <a:rPr lang="en" altLang="zh-TW" sz="1200" b="0" dirty="0" err="1">
-                <a:effectLst/>
-                <a:latin typeface="+mj-lt"/>
-                <a:ea typeface="+mj-ea"/>
-                <a:cs typeface="+mj-cs"/>
-                <a:sym typeface="Calibri"/>
-              </a:rPr>
-              <a:t>umd</a:t>
-            </a:r>
-            <a:r>
-              <a:rPr lang="en" altLang="zh-TW" sz="1200" b="0" dirty="0">
-                <a:effectLst/>
-                <a:latin typeface="+mj-lt"/>
-                <a:ea typeface="+mj-ea"/>
-                <a:cs typeface="+mj-cs"/>
-                <a:sym typeface="Calibri"/>
-              </a:rPr>
-              <a:t>/</a:t>
-            </a:r>
-            <a:r>
-              <a:rPr lang="en" altLang="zh-TW" sz="1200" b="0" dirty="0" err="1">
-                <a:effectLst/>
-                <a:latin typeface="+mj-lt"/>
-                <a:ea typeface="+mj-ea"/>
-                <a:cs typeface="+mj-cs"/>
-                <a:sym typeface="Calibri"/>
-              </a:rPr>
-              <a:t>popper.min.js</a:t>
-            </a:r>
-            <a:r>
-              <a:rPr lang="en" altLang="zh-TW" sz="1200" b="0" dirty="0">
-                <a:effectLst/>
-                <a:latin typeface="+mj-lt"/>
-                <a:ea typeface="+mj-ea"/>
-                <a:cs typeface="+mj-cs"/>
-                <a:sym typeface="Calibri"/>
-              </a:rPr>
-              <a:t>" integrity="sha384-Q6E9RHvbIyZFJoft+2mJbHaEWldlvI9IOYy5n3zV9zzTtmI3UksdQRVvoxMfooAo" </a:t>
-            </a:r>
-            <a:r>
-              <a:rPr lang="en" altLang="zh-TW" sz="1200" b="0" dirty="0" err="1">
-                <a:effectLst/>
-                <a:latin typeface="+mj-lt"/>
-                <a:ea typeface="+mj-ea"/>
-                <a:cs typeface="+mj-cs"/>
-                <a:sym typeface="Calibri"/>
-              </a:rPr>
-              <a:t>crossorigin</a:t>
-            </a:r>
-            <a:r>
-              <a:rPr lang="en" altLang="zh-TW" sz="1200" b="0" dirty="0">
-                <a:effectLst/>
-                <a:latin typeface="+mj-lt"/>
-                <a:ea typeface="+mj-ea"/>
-                <a:cs typeface="+mj-cs"/>
-                <a:sym typeface="Calibri"/>
-              </a:rPr>
-              <a:t>="anonymous"&gt;&lt;/script&gt;</a:t>
+              <a:t>&lt;script src="https://cdn.jsdelivr.net/npm/popper.js@1.16.0/dist/umd/popper.min.js&gt;&lt;/script&gt;</a:t>
             </a:r>
             <a:endParaRPr lang="en" altLang="zh-TW" sz="1200" b="0" kern="1200" dirty="0">
               <a:solidFill>
@@ -1685,163 +1395,7 @@
                 <a:ea typeface="微軟正黑體" panose="020B0604030504040204" pitchFamily="34" charset="-120"/>
                 <a:cs typeface="+mn-cs"/>
               </a:rPr>
-              <a:t>&lt;script </a:t>
-            </a:r>
-            <a:r>
-              <a:rPr lang="en" altLang="zh-TW" sz="1200" b="0" kern="1200" dirty="0" err="1">
-                <a:solidFill>
-                  <a:schemeClr val="tx1"/>
-                </a:solidFill>
-                <a:effectLst/>
-                <a:latin typeface="+mn-lt"/>
-                <a:ea typeface="微軟正黑體" panose="020B0604030504040204" pitchFamily="34" charset="-120"/>
-                <a:cs typeface="+mn-cs"/>
-              </a:rPr>
-              <a:t>src</a:t>
-            </a:r>
-            <a:r>
-              <a:rPr lang="en" altLang="zh-TW" sz="1200" b="0" kern="1200" dirty="0">
-                <a:solidFill>
-                  <a:schemeClr val="tx1"/>
-                </a:solidFill>
-                <a:effectLst/>
-                <a:latin typeface="+mn-lt"/>
-                <a:ea typeface="微軟正黑體" panose="020B0604030504040204" pitchFamily="34" charset="-120"/>
-                <a:cs typeface="+mn-cs"/>
-              </a:rPr>
-              <a:t>="https://</a:t>
-            </a:r>
-            <a:r>
-              <a:rPr lang="en" altLang="zh-TW" sz="1200" b="0" kern="1200" dirty="0" err="1">
-                <a:solidFill>
-                  <a:schemeClr val="tx1"/>
-                </a:solidFill>
-                <a:effectLst/>
-                <a:latin typeface="+mn-lt"/>
-                <a:ea typeface="微軟正黑體" panose="020B0604030504040204" pitchFamily="34" charset="-120"/>
-                <a:cs typeface="+mn-cs"/>
-              </a:rPr>
-              <a:t>stackpath.bootstrapcdn.com</a:t>
-            </a:r>
-            <a:r>
-              <a:rPr lang="en" altLang="zh-TW" sz="1200" b="0" kern="1200" dirty="0">
-                <a:solidFill>
-                  <a:schemeClr val="tx1"/>
-                </a:solidFill>
-                <a:effectLst/>
-                <a:latin typeface="+mn-lt"/>
-                <a:ea typeface="微軟正黑體" panose="020B0604030504040204" pitchFamily="34" charset="-120"/>
-                <a:cs typeface="+mn-cs"/>
-              </a:rPr>
-              <a:t>/bootstrap/4.5.0/</a:t>
-            </a:r>
-            <a:r>
-              <a:rPr lang="en" altLang="zh-TW" sz="1200" b="0" kern="1200" dirty="0" err="1">
-                <a:solidFill>
-                  <a:schemeClr val="tx1"/>
-                </a:solidFill>
-                <a:effectLst/>
-                <a:latin typeface="+mn-lt"/>
-                <a:ea typeface="微軟正黑體" panose="020B0604030504040204" pitchFamily="34" charset="-120"/>
-                <a:cs typeface="+mn-cs"/>
-              </a:rPr>
-              <a:t>js</a:t>
-            </a:r>
-            <a:r>
-              <a:rPr lang="en" altLang="zh-TW" sz="1200" b="0" kern="1200" dirty="0">
-                <a:solidFill>
-                  <a:schemeClr val="tx1"/>
-                </a:solidFill>
-                <a:effectLst/>
-                <a:latin typeface="+mn-lt"/>
-                <a:ea typeface="微軟正黑體" panose="020B0604030504040204" pitchFamily="34" charset="-120"/>
-                <a:cs typeface="+mn-cs"/>
-              </a:rPr>
-              <a:t>/</a:t>
-            </a:r>
-            <a:r>
-              <a:rPr lang="en" altLang="zh-TW" sz="1200" b="0" kern="1200" dirty="0" err="1">
-                <a:solidFill>
-                  <a:schemeClr val="tx1"/>
-                </a:solidFill>
-                <a:effectLst/>
-                <a:latin typeface="+mn-lt"/>
-                <a:ea typeface="微軟正黑體" panose="020B0604030504040204" pitchFamily="34" charset="-120"/>
-                <a:cs typeface="+mn-cs"/>
-              </a:rPr>
-              <a:t>bootstrap.min.js</a:t>
-            </a:r>
-            <a:r>
-              <a:rPr lang="en" altLang="zh-TW" sz="1200" b="0" kern="1200" dirty="0">
-                <a:solidFill>
-                  <a:schemeClr val="tx1"/>
-                </a:solidFill>
-                <a:effectLst/>
-                <a:latin typeface="+mn-lt"/>
-                <a:ea typeface="微軟正黑體" panose="020B0604030504040204" pitchFamily="34" charset="-120"/>
-                <a:cs typeface="+mn-cs"/>
-              </a:rPr>
-              <a:t>"</a:t>
-            </a:r>
-            <a:r>
-              <a:rPr lang="zh-TW" altLang="en-US" sz="1200" b="0" kern="1200" dirty="0">
-                <a:solidFill>
-                  <a:schemeClr val="tx1"/>
-                </a:solidFill>
-                <a:effectLst/>
-                <a:latin typeface="+mn-lt"/>
-                <a:ea typeface="微軟正黑體" panose="020B0604030504040204" pitchFamily="34" charset="-120"/>
-                <a:cs typeface="+mn-cs"/>
-              </a:rPr>
-              <a:t> </a:t>
-            </a:r>
-            <a:r>
-              <a:rPr lang="en" altLang="zh-TW" sz="1200" b="0" kern="1200" dirty="0">
-                <a:solidFill>
-                  <a:schemeClr val="tx1"/>
-                </a:solidFill>
-                <a:effectLst/>
-                <a:latin typeface="+mn-lt"/>
-                <a:ea typeface="微軟正黑體" panose="020B0604030504040204" pitchFamily="34" charset="-120"/>
-                <a:cs typeface="+mn-cs"/>
-              </a:rPr>
-              <a:t>integrity="sha384-OgVRvuATP1z7JjHLkuOU7Xw704+h835Lr+6QL9UvYjZE3Ipu6Tp75j7Bh/kR0JKI"</a:t>
-            </a:r>
-            <a:r>
-              <a:rPr lang="zh-TW" altLang="en-US" sz="1200" b="0" kern="1200" dirty="0">
-                <a:solidFill>
-                  <a:schemeClr val="tx1"/>
-                </a:solidFill>
-                <a:effectLst/>
-                <a:latin typeface="+mn-lt"/>
-                <a:ea typeface="微軟正黑體" panose="020B0604030504040204" pitchFamily="34" charset="-120"/>
-                <a:cs typeface="+mn-cs"/>
-              </a:rPr>
-              <a:t> </a:t>
-            </a:r>
-            <a:r>
-              <a:rPr lang="en" altLang="zh-TW" sz="1200" b="0" kern="1200" dirty="0" err="1">
-                <a:solidFill>
-                  <a:schemeClr val="tx1"/>
-                </a:solidFill>
-                <a:effectLst/>
-                <a:latin typeface="+mn-lt"/>
-                <a:ea typeface="微軟正黑體" panose="020B0604030504040204" pitchFamily="34" charset="-120"/>
-                <a:cs typeface="+mn-cs"/>
-              </a:rPr>
-              <a:t>crossorigin</a:t>
-            </a:r>
-            <a:r>
-              <a:rPr lang="en" altLang="zh-TW" sz="1200" b="0" kern="1200" dirty="0">
-                <a:solidFill>
-                  <a:schemeClr val="tx1"/>
-                </a:solidFill>
-                <a:effectLst/>
-                <a:latin typeface="+mn-lt"/>
-                <a:ea typeface="微軟正黑體" panose="020B0604030504040204" pitchFamily="34" charset="-120"/>
-                <a:cs typeface="+mn-cs"/>
-              </a:rPr>
-              <a:t>="anonymous"&gt;&lt;/script&gt;</a:t>
+              <a:t>&lt;script src="https://stackpath.bootstrapcdn.com/bootstrap/4.5.0/js/bootstrap.min.js&gt;&lt;/script&gt;</a:t>
             </a:r>
           </a:p>
         </p:txBody>
@@ -3771,7 +3325,7 @@
           </a:ln>
           <a:extLst>
             <a:ext uri="{C572A759-6A51-4108-AA02-DFA0A04FC94B}">
-              <ma14:wrappingTextBoxFlag xmlns="" xmlns:m="http://schemas.openxmlformats.org/officeDocument/2006/math" xmlns:a14="http://schemas.microsoft.com/office/drawing/2010/main" xmlns:ma14="http://schemas.microsoft.com/office/mac/drawingml/2011/main" val="1"/>
+              <ma14:wrappingTextBoxFlag xmlns:ma14="http://schemas.microsoft.com/office/mac/drawingml/2011/main" xmlns:a14="http://schemas.microsoft.com/office/drawing/2010/main" xmlns:m="http://schemas.openxmlformats.org/officeDocument/2006/math" xmlns="" val="1"/>
             </a:ext>
           </a:extLst>
         </p:spPr>
@@ -3810,7 +3364,7 @@
           </a:ln>
           <a:extLst>
             <a:ext uri="{C572A759-6A51-4108-AA02-DFA0A04FC94B}">
-              <ma14:wrappingTextBoxFlag xmlns="" xmlns:m="http://schemas.openxmlformats.org/officeDocument/2006/math" xmlns:a14="http://schemas.microsoft.com/office/drawing/2010/main" xmlns:ma14="http://schemas.microsoft.com/office/mac/drawingml/2011/main" val="1"/>
+              <ma14:wrappingTextBoxFlag xmlns:ma14="http://schemas.microsoft.com/office/mac/drawingml/2011/main" xmlns:a14="http://schemas.microsoft.com/office/drawing/2010/main" xmlns:m="http://schemas.openxmlformats.org/officeDocument/2006/math" xmlns="" val="1"/>
             </a:ext>
           </a:extLst>
         </p:spPr>
@@ -4782,7 +4336,7 @@
           </a:prstGeom>
           <a:extLst>
             <a:ext uri="{C572A759-6A51-4108-AA02-DFA0A04FC94B}">
-              <ma14:wrappingTextBoxFlag xmlns="" xmlns:m="http://schemas.openxmlformats.org/officeDocument/2006/math" xmlns:a14="http://schemas.microsoft.com/office/drawing/2010/main" xmlns:ma14="http://schemas.microsoft.com/office/mac/drawingml/2011/main" val="1"/>
+              <ma14:wrappingTextBoxFlag xmlns:ma14="http://schemas.microsoft.com/office/mac/drawingml/2011/main" xmlns:a14="http://schemas.microsoft.com/office/drawing/2010/main" xmlns:m="http://schemas.openxmlformats.org/officeDocument/2006/math" xmlns="" val="1"/>
             </a:ext>
           </a:extLst>
         </p:spPr>
@@ -4860,7 +4414,7 @@
           </a:ln>
           <a:extLst>
             <a:ext uri="{C572A759-6A51-4108-AA02-DFA0A04FC94B}">
-              <ma14:wrappingTextBoxFlag xmlns="" xmlns:m="http://schemas.openxmlformats.org/officeDocument/2006/math" xmlns:a14="http://schemas.microsoft.com/office/drawing/2010/main" xmlns:ma14="http://schemas.microsoft.com/office/mac/drawingml/2011/main" val="1"/>
+              <ma14:wrappingTextBoxFlag xmlns:ma14="http://schemas.microsoft.com/office/mac/drawingml/2011/main" xmlns:a14="http://schemas.microsoft.com/office/drawing/2010/main" xmlns:m="http://schemas.openxmlformats.org/officeDocument/2006/math" xmlns="" val="1"/>
             </a:ext>
           </a:extLst>
         </p:spPr>
@@ -5805,7 +5359,7 @@
           <p:nvPr/>
         </p:nvPicPr>
         <p:blipFill>
-          <a:blip r:embed="rId3">
+          <a:blip r:embed="rId3" cstate="print">
             <a:extLst>
               <a:ext uri="{28A0092B-C50C-407E-A947-70E740481C1C}">
                 <a14:useLocalDpi xmlns:a14="http://schemas.microsoft.com/office/drawing/2010/main" val="0"/>
@@ -5841,7 +5395,7 @@
           <p:nvPr/>
         </p:nvPicPr>
         <p:blipFill>
-          <a:blip r:embed="rId4">
+          <a:blip r:embed="rId4" cstate="print">
             <a:extLst>
               <a:ext uri="{28A0092B-C50C-407E-A947-70E740481C1C}">
                 <a14:useLocalDpi xmlns:a14="http://schemas.microsoft.com/office/drawing/2010/main" val="0"/>
@@ -5957,7 +5511,7 @@
           </a:prstGeom>
           <a:extLst>
             <a:ext uri="{C572A759-6A51-4108-AA02-DFA0A04FC94B}">
-              <ma14:wrappingTextBoxFlag xmlns="" xmlns:m="http://schemas.openxmlformats.org/officeDocument/2006/math" xmlns:a14="http://schemas.microsoft.com/office/drawing/2010/main" xmlns:ma14="http://schemas.microsoft.com/office/mac/drawingml/2011/main" val="1"/>
+              <ma14:wrappingTextBoxFlag xmlns:ma14="http://schemas.microsoft.com/office/mac/drawingml/2011/main" xmlns:a14="http://schemas.microsoft.com/office/drawing/2010/main" xmlns:m="http://schemas.openxmlformats.org/officeDocument/2006/math" xmlns="" val="1"/>
             </a:ext>
           </a:extLst>
         </p:spPr>
@@ -6032,7 +5586,7 @@
           </a:ln>
           <a:extLst>
             <a:ext uri="{C572A759-6A51-4108-AA02-DFA0A04FC94B}">
-              <ma14:wrappingTextBoxFlag xmlns="" xmlns:m="http://schemas.openxmlformats.org/officeDocument/2006/math" xmlns:a14="http://schemas.microsoft.com/office/drawing/2010/main" xmlns:ma14="http://schemas.microsoft.com/office/mac/drawingml/2011/main" val="1"/>
+              <ma14:wrappingTextBoxFlag xmlns:ma14="http://schemas.microsoft.com/office/mac/drawingml/2011/main" xmlns:a14="http://schemas.microsoft.com/office/drawing/2010/main" xmlns:m="http://schemas.openxmlformats.org/officeDocument/2006/math" xmlns="" val="1"/>
             </a:ext>
           </a:extLst>
         </p:spPr>
@@ -6127,7 +5681,7 @@
           </a:prstGeom>
           <a:extLst>
             <a:ext uri="{C572A759-6A51-4108-AA02-DFA0A04FC94B}">
-              <ma14:wrappingTextBoxFlag xmlns="" xmlns:m="http://schemas.openxmlformats.org/officeDocument/2006/math" xmlns:a14="http://schemas.microsoft.com/office/drawing/2010/main" xmlns:ma14="http://schemas.microsoft.com/office/mac/drawingml/2011/main" val="1"/>
+              <ma14:wrappingTextBoxFlag xmlns:ma14="http://schemas.microsoft.com/office/mac/drawingml/2011/main" xmlns:a14="http://schemas.microsoft.com/office/drawing/2010/main" xmlns:m="http://schemas.openxmlformats.org/officeDocument/2006/math" xmlns="" val="1"/>
             </a:ext>
           </a:extLst>
         </p:spPr>
@@ -6204,7 +5758,7 @@
           </a:ln>
           <a:extLst>
             <a:ext uri="{C572A759-6A51-4108-AA02-DFA0A04FC94B}">
-              <ma14:wrappingTextBoxFlag xmlns="" xmlns:m="http://schemas.openxmlformats.org/officeDocument/2006/math" xmlns:a14="http://schemas.microsoft.com/office/drawing/2010/main" xmlns:ma14="http://schemas.microsoft.com/office/mac/drawingml/2011/main" val="1"/>
+              <ma14:wrappingTextBoxFlag xmlns:ma14="http://schemas.microsoft.com/office/mac/drawingml/2011/main" xmlns:a14="http://schemas.microsoft.com/office/drawing/2010/main" xmlns:m="http://schemas.openxmlformats.org/officeDocument/2006/math" xmlns="" val="1"/>
             </a:ext>
           </a:extLst>
         </p:spPr>
@@ -6346,7 +5900,7 @@
           </a:prstGeom>
           <a:extLst>
             <a:ext uri="{C572A759-6A51-4108-AA02-DFA0A04FC94B}">
-              <ma14:wrappingTextBoxFlag xmlns="" xmlns:m="http://schemas.openxmlformats.org/officeDocument/2006/math" xmlns:a14="http://schemas.microsoft.com/office/drawing/2010/main" xmlns:ma14="http://schemas.microsoft.com/office/mac/drawingml/2011/main" val="1"/>
+              <ma14:wrappingTextBoxFlag xmlns:ma14="http://schemas.microsoft.com/office/mac/drawingml/2011/main" xmlns:a14="http://schemas.microsoft.com/office/drawing/2010/main" xmlns:m="http://schemas.openxmlformats.org/officeDocument/2006/math" xmlns="" val="1"/>
             </a:ext>
           </a:extLst>
         </p:spPr>
@@ -7321,106 +6875,7 @@
               <a:rPr lang="en-US" altLang="zh-TW" sz="1900" dirty="0">
                 <a:latin typeface="Consolas" panose="020B0609020204030204" pitchFamily="49" charset="0"/>
               </a:rPr>
-              <a:t>" integrity="</a:t>
-            </a:r>
-            <a:r>
-              <a:rPr lang="en-US" altLang="zh-TW" sz="1900" dirty="0">
-                <a:solidFill>
-                  <a:schemeClr val="bg1">
-                    <a:lumMod val="65000"/>
-                  </a:schemeClr>
-                </a:solidFill>
-                <a:latin typeface="Consolas" panose="020B0609020204030204" pitchFamily="49" charset="0"/>
-              </a:rPr>
-              <a:t>sha384-9aIt2nRpC12Uk9gS9baDl411NQApFmC26EwAOH8WgZl5MYYxFfc+NcPb1dKGj7Sk</a:t>
-            </a:r>
-            <a:r>
-              <a:rPr lang="en-US" altLang="zh-TW" sz="1900" dirty="0">
-                <a:latin typeface="Consolas" panose="020B0609020204030204" pitchFamily="49" charset="0"/>
-              </a:rPr>
-              <a:t>" </a:t>
-            </a:r>
-            <a:r>
-              <a:rPr lang="en-US" altLang="zh-TW" sz="1900" dirty="0" err="1">
-                <a:latin typeface="Consolas" panose="020B0609020204030204" pitchFamily="49" charset="0"/>
-              </a:rPr>
-              <a:t>crossorigin</a:t>
-            </a:r>
-            <a:r>
-              <a:rPr lang="en-US" altLang="zh-TW" sz="1900" dirty="0">
-                <a:latin typeface="Consolas" panose="020B0609020204030204" pitchFamily="49" charset="0"/>
-              </a:rPr>
-              <a:t>="</a:t>
-            </a:r>
-            <a:r>
-              <a:rPr lang="en-US" altLang="zh-TW" sz="1900" dirty="0">
-                <a:solidFill>
-                  <a:srgbClr val="00B050"/>
-                </a:solidFill>
-                <a:latin typeface="Consolas" panose="020B0609020204030204" pitchFamily="49" charset="0"/>
-              </a:rPr>
-              <a:t>anonymous</a:t>
-            </a:r>
-            <a:r>
-              <a:rPr lang="en-US" altLang="zh-TW" sz="1900" dirty="0">
-                <a:latin typeface="Consolas" panose="020B0609020204030204" pitchFamily="49" charset="0"/>
-              </a:rPr>
-              <a:t>"&gt;</a:t>
-            </a:r>
-          </a:p>
-        </p:txBody>
-      </p:sp>
-      <p:sp>
-        <p:nvSpPr>
-          <p:cNvPr id="4" name="文字方塊 3">
-            <a:extLst>
-              <a:ext uri="{FF2B5EF4-FFF2-40B4-BE49-F238E27FC236}">
-                <a16:creationId xmlns:a16="http://schemas.microsoft.com/office/drawing/2014/main" id="{38B49C9A-EF86-4346-889E-897A362A42DF}"/>
-              </a:ext>
-            </a:extLst>
-          </p:cNvPr>
-          <p:cNvSpPr txBox="1"/>
-          <p:nvPr/>
-        </p:nvSpPr>
-        <p:spPr>
-          <a:xfrm>
-            <a:off x="0" y="6565611"/>
-            <a:ext cx="6679580" cy="292388"/>
-          </a:xfrm>
-          <a:prstGeom prst="rect">
-            <a:avLst/>
-          </a:prstGeom>
-          <a:noFill/>
-        </p:spPr>
-        <p:txBody>
-          <a:bodyPr wrap="square" rtlCol="0">
-            <a:spAutoFit/>
-          </a:bodyPr>
-          <a:lstStyle/>
-          <a:p>
-            <a:r>
-              <a:rPr kumimoji="1" lang="en-US" altLang="zh-TW" sz="1300" dirty="0">
-                <a:solidFill>
-                  <a:srgbClr val="FF0000"/>
-                </a:solidFill>
-              </a:rPr>
-              <a:t>Integrity</a:t>
-            </a:r>
-            <a:r>
-              <a:rPr kumimoji="1" lang="zh-TW" altLang="en-US" sz="1300" dirty="0"/>
-              <a:t>：確保第三方資源未被惡意竄改   </a:t>
-            </a:r>
-            <a:r>
-              <a:rPr kumimoji="1" lang="en" altLang="zh-TW" sz="1300" dirty="0" err="1">
-                <a:solidFill>
-                  <a:srgbClr val="FF0000"/>
-                </a:solidFill>
-              </a:rPr>
-              <a:t>crossorigin</a:t>
-            </a:r>
-            <a:r>
-              <a:rPr kumimoji="1" lang="zh-TW" altLang="en-US" sz="1300" dirty="0"/>
-              <a:t>：使用跨域的形式載入指定檔案</a:t>
+              <a:t>" &gt;</a:t>
             </a:r>
           </a:p>
         </p:txBody>
@@ -7536,7 +6991,7 @@
         </p:spPr>
         <p:txBody>
           <a:bodyPr anchor="ctr">
-            <a:normAutofit fontScale="70000" lnSpcReduction="20000"/>
+            <a:normAutofit fontScale="85000" lnSpcReduction="10000"/>
           </a:bodyPr>
           <a:lstStyle/>
           <a:p>
@@ -7609,69 +7064,7 @@
                 </a:solidFill>
                 <a:latin typeface="Consolas" panose="020B0609020204030204" pitchFamily="49" charset="0"/>
               </a:rPr>
-              <a:t>https://</a:t>
-            </a:r>
-            <a:r>
-              <a:rPr lang="en-US" altLang="zh-TW" sz="2000" dirty="0" err="1">
-                <a:solidFill>
-                  <a:srgbClr val="00B050"/>
-                </a:solidFill>
-                <a:latin typeface="Consolas" panose="020B0609020204030204" pitchFamily="49" charset="0"/>
-              </a:rPr>
-              <a:t>code.jquery.com</a:t>
-            </a:r>
-            <a:r>
-              <a:rPr lang="en-US" altLang="zh-TW" sz="2000" dirty="0">
-                <a:solidFill>
-                  <a:srgbClr val="00B050"/>
-                </a:solidFill>
-                <a:latin typeface="Consolas" panose="020B0609020204030204" pitchFamily="49" charset="0"/>
-              </a:rPr>
-              <a:t>/jquery-3.5.1.slim.min.js</a:t>
-            </a:r>
-            <a:r>
-              <a:rPr lang="en-US" altLang="zh-TW" sz="2000" dirty="0">
-                <a:latin typeface="Consolas" panose="020B0609020204030204" pitchFamily="49" charset="0"/>
-              </a:rPr>
-              <a:t>" integrity="</a:t>
-            </a:r>
-            <a:r>
-              <a:rPr lang="en-US" altLang="zh-TW" sz="2000" dirty="0">
-                <a:solidFill>
-                  <a:schemeClr val="bg1">
-                    <a:lumMod val="65000"/>
-                  </a:schemeClr>
-                </a:solidFill>
-                <a:latin typeface="Consolas" panose="020B0609020204030204" pitchFamily="49" charset="0"/>
-              </a:rPr>
-              <a:t>sha384-DfXdz2htPH0lsSSs5nCTpuj/zy4C+OGpamoFVy38MVBnE+IbbVYUew+OrCXaRkfj</a:t>
-            </a:r>
-            <a:r>
-              <a:rPr lang="en-US" altLang="zh-TW" sz="2000" dirty="0">
-                <a:latin typeface="Consolas" panose="020B0609020204030204" pitchFamily="49" charset="0"/>
-              </a:rPr>
-              <a:t>" </a:t>
-            </a:r>
-            <a:r>
-              <a:rPr lang="en-US" altLang="zh-TW" sz="2000" dirty="0" err="1">
-                <a:latin typeface="Consolas" panose="020B0609020204030204" pitchFamily="49" charset="0"/>
-              </a:rPr>
-              <a:t>crossorigin</a:t>
-            </a:r>
-            <a:r>
-              <a:rPr lang="en-US" altLang="zh-TW" sz="2000" dirty="0">
-                <a:latin typeface="Consolas" panose="020B0609020204030204" pitchFamily="49" charset="0"/>
-              </a:rPr>
-              <a:t>="</a:t>
-            </a:r>
-            <a:r>
-              <a:rPr lang="en-US" altLang="zh-TW" sz="2000" dirty="0">
-                <a:solidFill>
-                  <a:srgbClr val="00B050"/>
-                </a:solidFill>
-                <a:latin typeface="Consolas" panose="020B0609020204030204" pitchFamily="49" charset="0"/>
-              </a:rPr>
-              <a:t>anonymous</a:t>
+              <a:t>https://code.jquery.com/jquery-3.5.1.slim.min.js</a:t>
             </a:r>
             <a:r>
               <a:rPr lang="en-US" altLang="zh-TW" sz="2000" dirty="0">
@@ -7759,7 +7152,7 @@
                 </a:solidFill>
                 <a:latin typeface="Consolas" panose="020B0609020204030204" pitchFamily="49" charset="0"/>
               </a:rPr>
-              <a:t>https://</a:t>
+              <a:t>https://cdn.jsdelivr.net/</a:t>
             </a:r>
             <a:r>
               <a:rPr lang="en-US" altLang="zh-TW" sz="2000" dirty="0" err="1">
@@ -7768,7 +7161,7 @@
                 </a:solidFill>
                 <a:latin typeface="Consolas" panose="020B0609020204030204" pitchFamily="49" charset="0"/>
               </a:rPr>
-              <a:t>cdn.jsdelivr.net</a:t>
+              <a:t>npm</a:t>
             </a:r>
             <a:r>
               <a:rPr lang="en-US" altLang="zh-TW" sz="2000" dirty="0">
@@ -7777,7 +7170,7 @@
                 </a:solidFill>
                 <a:latin typeface="Consolas" panose="020B0609020204030204" pitchFamily="49" charset="0"/>
               </a:rPr>
-              <a:t>/</a:t>
+              <a:t>/popper.js@1.16.0/</a:t>
             </a:r>
             <a:r>
               <a:rPr lang="en-US" altLang="zh-TW" sz="2000" dirty="0" err="1">
@@ -7786,7 +7179,7 @@
                 </a:solidFill>
                 <a:latin typeface="Consolas" panose="020B0609020204030204" pitchFamily="49" charset="0"/>
               </a:rPr>
-              <a:t>npm</a:t>
+              <a:t>dist</a:t>
             </a:r>
             <a:r>
               <a:rPr lang="en-US" altLang="zh-TW" sz="2000" dirty="0">
@@ -7795,7 +7188,7 @@
                 </a:solidFill>
                 <a:latin typeface="Consolas" panose="020B0609020204030204" pitchFamily="49" charset="0"/>
               </a:rPr>
-              <a:t>/popper.js@1.16.0/</a:t>
+              <a:t>/</a:t>
             </a:r>
             <a:r>
               <a:rPr lang="en-US" altLang="zh-TW" sz="2000" dirty="0" err="1">
@@ -7804,7 +7197,7 @@
                 </a:solidFill>
                 <a:latin typeface="Consolas" panose="020B0609020204030204" pitchFamily="49" charset="0"/>
               </a:rPr>
-              <a:t>dist</a:t>
+              <a:t>umd</a:t>
             </a:r>
             <a:r>
               <a:rPr lang="en-US" altLang="zh-TW" sz="2000" dirty="0">
@@ -7813,78 +7206,7 @@
                 </a:solidFill>
                 <a:latin typeface="Consolas" panose="020B0609020204030204" pitchFamily="49" charset="0"/>
               </a:rPr>
-              <a:t>/</a:t>
-            </a:r>
-            <a:r>
-              <a:rPr lang="en-US" altLang="zh-TW" sz="2000" dirty="0" err="1">
-                <a:solidFill>
-                  <a:srgbClr val="00B050"/>
-                </a:solidFill>
-                <a:latin typeface="Consolas" panose="020B0609020204030204" pitchFamily="49" charset="0"/>
-              </a:rPr>
-              <a:t>umd</a:t>
-            </a:r>
-            <a:r>
-              <a:rPr lang="en-US" altLang="zh-TW" sz="2000" dirty="0">
-                <a:solidFill>
-                  <a:srgbClr val="00B050"/>
-                </a:solidFill>
-                <a:latin typeface="Consolas" panose="020B0609020204030204" pitchFamily="49" charset="0"/>
-              </a:rPr>
-              <a:t>/</a:t>
-            </a:r>
-            <a:r>
-              <a:rPr lang="en-US" altLang="zh-TW" sz="2000" dirty="0" err="1">
-                <a:solidFill>
-                  <a:srgbClr val="00B050"/>
-                </a:solidFill>
-                <a:latin typeface="Consolas" panose="020B0609020204030204" pitchFamily="49" charset="0"/>
-              </a:rPr>
-              <a:t>popper.min.js</a:t>
-            </a:r>
-            <a:r>
-              <a:rPr lang="en-US" altLang="zh-TW" sz="2000" dirty="0">
-                <a:latin typeface="Consolas" panose="020B0609020204030204" pitchFamily="49" charset="0"/>
-              </a:rPr>
-              <a:t>" integrity="</a:t>
-            </a:r>
-            <a:r>
-              <a:rPr lang="en-US" altLang="zh-TW" sz="2000" dirty="0">
-                <a:solidFill>
-                  <a:schemeClr val="bg1">
-                    <a:lumMod val="65000"/>
-                  </a:schemeClr>
-                </a:solidFill>
-                <a:latin typeface="Consolas" panose="020B0609020204030204" pitchFamily="49" charset="0"/>
-              </a:rPr>
-              <a:t>sha384-Q6E9RHvbIyZFJoft+2mJbHaEWldlvI9IOYy5n3zV9zzTtmI3UksdQRVvoxMfooAo</a:t>
-            </a:r>
-            <a:r>
-              <a:rPr lang="en-US" altLang="zh-TW" sz="2000" dirty="0">
-                <a:latin typeface="Consolas" panose="020B0609020204030204" pitchFamily="49" charset="0"/>
-              </a:rPr>
-              <a:t>" </a:t>
-            </a:r>
-            <a:r>
-              <a:rPr lang="en-US" altLang="zh-TW" sz="2000" dirty="0" err="1">
-                <a:latin typeface="Consolas" panose="020B0609020204030204" pitchFamily="49" charset="0"/>
-              </a:rPr>
-              <a:t>crossorigin</a:t>
-            </a:r>
-            <a:r>
-              <a:rPr lang="en-US" altLang="zh-TW" sz="2000" dirty="0">
-                <a:latin typeface="Consolas" panose="020B0609020204030204" pitchFamily="49" charset="0"/>
-              </a:rPr>
-              <a:t>="</a:t>
-            </a:r>
-            <a:r>
-              <a:rPr lang="en-US" altLang="zh-TW" sz="2000" dirty="0">
-                <a:solidFill>
-                  <a:srgbClr val="00B050"/>
-                </a:solidFill>
-                <a:latin typeface="Consolas" panose="020B0609020204030204" pitchFamily="49" charset="0"/>
-              </a:rPr>
-              <a:t>anonymous</a:t>
+              <a:t>/popper.min.js</a:t>
             </a:r>
             <a:r>
               <a:rPr lang="en-US" altLang="zh-TW" sz="2000" dirty="0">
@@ -7978,7 +7300,7 @@
                 </a:solidFill>
                 <a:latin typeface="Consolas" panose="020B0609020204030204" pitchFamily="49" charset="0"/>
               </a:rPr>
-              <a:t>https://</a:t>
+              <a:t>https://stackpath.bootstrapcdn.com/bootstrap/4.5.0/</a:t>
             </a:r>
             <a:r>
               <a:rPr lang="en-US" altLang="zh-TW" sz="2000" dirty="0" err="1">
@@ -7987,7 +7309,7 @@
                 </a:solidFill>
                 <a:latin typeface="Consolas" panose="020B0609020204030204" pitchFamily="49" charset="0"/>
               </a:rPr>
-              <a:t>stackpath.bootstrapcdn.com</a:t>
+              <a:t>js</a:t>
             </a:r>
             <a:r>
               <a:rPr lang="en-US" altLang="zh-TW" sz="2000" dirty="0">
@@ -7996,78 +7318,7 @@
                 </a:solidFill>
                 <a:latin typeface="Consolas" panose="020B0609020204030204" pitchFamily="49" charset="0"/>
               </a:rPr>
-              <a:t>/bootstrap/4.5.0/</a:t>
-            </a:r>
-            <a:r>
-              <a:rPr lang="en-US" altLang="zh-TW" sz="2000" dirty="0" err="1">
-                <a:solidFill>
-                  <a:srgbClr val="00B050"/>
-                </a:solidFill>
-                <a:latin typeface="Consolas" panose="020B0609020204030204" pitchFamily="49" charset="0"/>
-              </a:rPr>
-              <a:t>js</a:t>
-            </a:r>
-            <a:r>
-              <a:rPr lang="en-US" altLang="zh-TW" sz="2000" dirty="0">
-                <a:solidFill>
-                  <a:srgbClr val="00B050"/>
-                </a:solidFill>
-                <a:latin typeface="Consolas" panose="020B0609020204030204" pitchFamily="49" charset="0"/>
-              </a:rPr>
-              <a:t>/</a:t>
-            </a:r>
-            <a:r>
-              <a:rPr lang="en-US" altLang="zh-TW" sz="2000" dirty="0" err="1">
-                <a:solidFill>
-                  <a:srgbClr val="00B050"/>
-                </a:solidFill>
-                <a:latin typeface="Consolas" panose="020B0609020204030204" pitchFamily="49" charset="0"/>
-              </a:rPr>
-              <a:t>bootstrap.min.js</a:t>
-            </a:r>
-            <a:r>
-              <a:rPr lang="en-US" altLang="zh-TW" sz="2000" dirty="0">
-                <a:latin typeface="Consolas" panose="020B0609020204030204" pitchFamily="49" charset="0"/>
-              </a:rPr>
-              <a:t>" integrity="</a:t>
-            </a:r>
-            <a:r>
-              <a:rPr lang="en-US" altLang="zh-TW" sz="2000" dirty="0">
-                <a:solidFill>
-                  <a:schemeClr val="bg1">
-                    <a:lumMod val="65000"/>
-                  </a:schemeClr>
-                </a:solidFill>
-                <a:latin typeface="Consolas" panose="020B0609020204030204" pitchFamily="49" charset="0"/>
-              </a:rPr>
-              <a:t>sha384-OgVRvuATP1z7JjHLkuOU7Xw704+h835Lr+6QL9UvYjZE3Ipu6Tp75j7Bh/kR0JKI</a:t>
-            </a:r>
-            <a:r>
-              <a:rPr lang="en-US" altLang="zh-TW" sz="2000" dirty="0">
-                <a:latin typeface="Consolas" panose="020B0609020204030204" pitchFamily="49" charset="0"/>
-              </a:rPr>
-              <a:t>" </a:t>
-            </a:r>
-            <a:r>
-              <a:rPr lang="en-US" altLang="zh-TW" sz="2000" dirty="0" err="1">
-                <a:latin typeface="Consolas" panose="020B0609020204030204" pitchFamily="49" charset="0"/>
-              </a:rPr>
-              <a:t>crossorigin</a:t>
-            </a:r>
-            <a:r>
-              <a:rPr lang="en-US" altLang="zh-TW" sz="2000" dirty="0">
-                <a:latin typeface="Consolas" panose="020B0609020204030204" pitchFamily="49" charset="0"/>
-              </a:rPr>
-              <a:t>="</a:t>
-            </a:r>
-            <a:r>
-              <a:rPr lang="en-US" altLang="zh-TW" sz="2000" dirty="0">
-                <a:solidFill>
-                  <a:srgbClr val="00B050"/>
-                </a:solidFill>
-                <a:latin typeface="Consolas" panose="020B0609020204030204" pitchFamily="49" charset="0"/>
-              </a:rPr>
-              <a:t>anonymous</a:t>
+              <a:t>/bootstrap.min.js</a:t>
             </a:r>
             <a:r>
               <a:rPr lang="en-US" altLang="zh-TW" sz="2000" dirty="0">
@@ -8089,61 +7340,6 @@
                 <a:latin typeface="Consolas" panose="020B0609020204030204" pitchFamily="49" charset="0"/>
               </a:rPr>
               <a:t>&gt;</a:t>
-            </a:r>
-          </a:p>
-        </p:txBody>
-      </p:sp>
-      <p:sp>
-        <p:nvSpPr>
-          <p:cNvPr id="4" name="文字方塊 3">
-            <a:extLst>
-              <a:ext uri="{FF2B5EF4-FFF2-40B4-BE49-F238E27FC236}">
-                <a16:creationId xmlns:a16="http://schemas.microsoft.com/office/drawing/2014/main" id="{38B49C9A-EF86-4346-889E-897A362A42DF}"/>
-              </a:ext>
-            </a:extLst>
-          </p:cNvPr>
-          <p:cNvSpPr txBox="1"/>
-          <p:nvPr/>
-        </p:nvSpPr>
-        <p:spPr>
-          <a:xfrm>
-            <a:off x="0" y="6565611"/>
-            <a:ext cx="6679580" cy="292388"/>
-          </a:xfrm>
-          <a:prstGeom prst="rect">
-            <a:avLst/>
-          </a:prstGeom>
-          <a:noFill/>
-        </p:spPr>
-        <p:txBody>
-          <a:bodyPr wrap="square" rtlCol="0">
-            <a:spAutoFit/>
-          </a:bodyPr>
-          <a:lstStyle/>
-          <a:p>
-            <a:r>
-              <a:rPr kumimoji="1" lang="en-US" altLang="zh-TW" sz="1300" dirty="0">
-                <a:solidFill>
-                  <a:srgbClr val="FF0000"/>
-                </a:solidFill>
-              </a:rPr>
-              <a:t>Integrity</a:t>
-            </a:r>
-            <a:r>
-              <a:rPr kumimoji="1" lang="zh-TW" altLang="en-US" sz="1300" dirty="0"/>
-              <a:t>：確保第三方資源未被惡意竄改   </a:t>
-            </a:r>
-            <a:r>
-              <a:rPr kumimoji="1" lang="en" altLang="zh-TW" sz="1300" dirty="0" err="1">
-                <a:solidFill>
-                  <a:srgbClr val="FF0000"/>
-                </a:solidFill>
-              </a:rPr>
-              <a:t>crossorigin</a:t>
-            </a:r>
-            <a:r>
-              <a:rPr kumimoji="1" lang="zh-TW" altLang="en-US" sz="1300" dirty="0"/>
-              <a:t>：使用跨域的形式載入指定檔案</a:t>
             </a:r>
           </a:p>
         </p:txBody>
@@ -8199,7 +7395,7 @@
           </a:prstGeom>
           <a:extLst>
             <a:ext uri="{C572A759-6A51-4108-AA02-DFA0A04FC94B}">
-              <ma14:wrappingTextBoxFlag xmlns="" xmlns:m="http://schemas.openxmlformats.org/officeDocument/2006/math" xmlns:a14="http://schemas.microsoft.com/office/drawing/2010/main" xmlns:ma14="http://schemas.microsoft.com/office/mac/drawingml/2011/main" val="1"/>
+              <ma14:wrappingTextBoxFlag xmlns:ma14="http://schemas.microsoft.com/office/mac/drawingml/2011/main" xmlns:a14="http://schemas.microsoft.com/office/drawing/2010/main" xmlns:m="http://schemas.openxmlformats.org/officeDocument/2006/math" xmlns="" val="1"/>
             </a:ext>
           </a:extLst>
         </p:spPr>
@@ -8348,7 +7544,7 @@
           </a:prstGeom>
           <a:extLst>
             <a:ext uri="{C572A759-6A51-4108-AA02-DFA0A04FC94B}">
-              <ma14:wrappingTextBoxFlag xmlns="" xmlns:m="http://schemas.openxmlformats.org/officeDocument/2006/math" xmlns:a14="http://schemas.microsoft.com/office/drawing/2010/main" xmlns:ma14="http://schemas.microsoft.com/office/mac/drawingml/2011/main" val="1"/>
+              <ma14:wrappingTextBoxFlag xmlns:ma14="http://schemas.microsoft.com/office/mac/drawingml/2011/main" xmlns:a14="http://schemas.microsoft.com/office/drawing/2010/main" xmlns:m="http://schemas.openxmlformats.org/officeDocument/2006/math" xmlns="" val="1"/>
             </a:ext>
           </a:extLst>
         </p:spPr>
@@ -8540,7 +7736,7 @@
           </a:ln>
           <a:extLst>
             <a:ext uri="{C572A759-6A51-4108-AA02-DFA0A04FC94B}">
-              <ma14:wrappingTextBoxFlag xmlns="" xmlns:m="http://schemas.openxmlformats.org/officeDocument/2006/math" xmlns:a14="http://schemas.microsoft.com/office/drawing/2010/main" xmlns:ma14="http://schemas.microsoft.com/office/mac/drawingml/2011/main" val="1"/>
+              <ma14:wrappingTextBoxFlag xmlns:ma14="http://schemas.microsoft.com/office/mac/drawingml/2011/main" xmlns:a14="http://schemas.microsoft.com/office/drawing/2010/main" xmlns:m="http://schemas.openxmlformats.org/officeDocument/2006/math" xmlns="" val="1"/>
             </a:ext>
           </a:extLst>
         </p:spPr>

</xml_diff>